<commit_message>
Word thêm hình + powerpoint
</commit_message>
<xml_diff>
--- a/PROJECT ACCP SEM 3_new.pptx
+++ b/PROJECT ACCP SEM 3_new.pptx
@@ -767,7 +767,7 @@
             <a:fld id="{1E700B27-DE4C-4B9E-BB11-B9027034A00F}" type="datetimeFigureOut">
               <a:rPr lang="en-US" dirty="0"/>
               <a:pPr/>
-              <a:t>10/31/2016</a:t>
+              <a:t>5/15/17</a:t>
             </a:fld>
             <a:endParaRPr lang="en-US" dirty="0"/>
           </a:p>
@@ -1887,7 +1887,7 @@
           <a:p>
             <a:fld id="{C40F4739-9812-4A9F-890D-2AD6BA5F6EE8}" type="datetimeFigureOut">
               <a:rPr lang="en-US" dirty="0"/>
-              <a:t>10/31/2016</a:t>
+              <a:t>5/15/17</a:t>
             </a:fld>
             <a:endParaRPr lang="en-US" dirty="0"/>
           </a:p>
@@ -2898,7 +2898,7 @@
           <a:p>
             <a:fld id="{18845AC5-A3F8-44AA-BA8F-596CDCC976D3}" type="datetimeFigureOut">
               <a:rPr lang="en-US" dirty="0"/>
-              <a:t>10/31/2016</a:t>
+              <a:t>5/15/17</a:t>
             </a:fld>
             <a:endParaRPr lang="en-US" dirty="0"/>
           </a:p>
@@ -4068,7 +4068,7 @@
           <a:p>
             <a:fld id="{C873B183-A821-4095-A363-9EC968635539}" type="datetimeFigureOut">
               <a:rPr lang="en-US" dirty="0"/>
-              <a:t>10/31/2016</a:t>
+              <a:t>5/15/17</a:t>
             </a:fld>
             <a:endParaRPr lang="en-US" dirty="0"/>
           </a:p>
@@ -5129,7 +5129,7 @@
           <a:p>
             <a:fld id="{174D01B4-0AA5-45E6-B2E6-5FA4078AEBCF}" type="datetimeFigureOut">
               <a:rPr lang="en-US" dirty="0"/>
-              <a:t>10/31/2016</a:t>
+              <a:t>5/15/17</a:t>
             </a:fld>
             <a:endParaRPr lang="en-US" dirty="0"/>
           </a:p>
@@ -5775,7 +5775,7 @@
           <a:p>
             <a:fld id="{4147335C-0450-40D7-8612-B3203BED4F28}" type="datetimeFigureOut">
               <a:rPr lang="en-US" dirty="0"/>
-              <a:t>10/31/2016</a:t>
+              <a:t>5/15/17</a:t>
             </a:fld>
             <a:endParaRPr lang="en-US" dirty="0"/>
           </a:p>
@@ -6622,7 +6622,7 @@
           <a:p>
             <a:fld id="{D246A105-2A1C-4284-B4EA-07CF89B1A393}" type="datetimeFigureOut">
               <a:rPr lang="en-US" dirty="0"/>
-              <a:t>10/31/2016</a:t>
+              <a:t>5/15/17</a:t>
             </a:fld>
             <a:endParaRPr lang="en-US" dirty="0"/>
           </a:p>
@@ -6797,7 +6797,7 @@
           <a:p>
             <a:fld id="{80DBE609-F3F2-45E6-BD6A-E03A8C86C1AE}" type="datetimeFigureOut">
               <a:rPr lang="en-US" dirty="0"/>
-              <a:t>10/31/2016</a:t>
+              <a:t>5/15/17</a:t>
             </a:fld>
             <a:endParaRPr lang="en-US" dirty="0"/>
           </a:p>
@@ -7795,7 +7795,7 @@
           <a:p>
             <a:fld id="{7A24AD68-089C-4467-A8F3-EA2BBCA6B44E}" type="datetimeFigureOut">
               <a:rPr lang="en-US" dirty="0"/>
-              <a:t>10/31/2016</a:t>
+              <a:t>5/15/17</a:t>
             </a:fld>
             <a:endParaRPr lang="en-US" dirty="0"/>
           </a:p>
@@ -8001,7 +8001,7 @@
           <a:p>
             <a:fld id="{75C51FCE-E4BB-4680-8E50-3C0E348D2609}" type="datetimeFigureOut">
               <a:rPr lang="en-US" dirty="0"/>
-              <a:t>10/31/2016</a:t>
+              <a:t>5/15/17</a:t>
             </a:fld>
             <a:endParaRPr lang="en-US" dirty="0"/>
           </a:p>
@@ -9063,7 +9063,7 @@
           <a:p>
             <a:fld id="{8AAA073D-A903-47F8-8D16-77642FB0DF1F}" type="datetimeFigureOut">
               <a:rPr lang="en-US" dirty="0"/>
-              <a:t>10/31/2016</a:t>
+              <a:t>5/15/17</a:t>
             </a:fld>
             <a:endParaRPr lang="en-US" dirty="0"/>
           </a:p>
@@ -9335,7 +9335,7 @@
           <a:p>
             <a:fld id="{AB91FA40-626B-4CA1-85D0-7A9016E395BA}" type="datetimeFigureOut">
               <a:rPr lang="en-US" dirty="0"/>
-              <a:t>10/31/2016</a:t>
+              <a:t>5/15/17</a:t>
             </a:fld>
             <a:endParaRPr lang="en-US" dirty="0"/>
           </a:p>
@@ -9717,7 +9717,7 @@
           <a:p>
             <a:fld id="{C3F425EA-B9DC-48A7-991E-9A82573B1B21}" type="datetimeFigureOut">
               <a:rPr lang="en-US" dirty="0"/>
-              <a:t>10/31/2016</a:t>
+              <a:t>5/15/17</a:t>
             </a:fld>
             <a:endParaRPr lang="en-US" dirty="0"/>
           </a:p>
@@ -9835,7 +9835,7 @@
           <a:p>
             <a:fld id="{66CB97F8-6CEB-469B-AFCC-889F2A2B1D5A}" type="datetimeFigureOut">
               <a:rPr lang="en-US" dirty="0"/>
-              <a:t>10/31/2016</a:t>
+              <a:t>5/15/17</a:t>
             </a:fld>
             <a:endParaRPr lang="en-US" dirty="0"/>
           </a:p>
@@ -9930,7 +9930,7 @@
           <a:p>
             <a:fld id="{8FA9179F-009E-4FA5-B091-7EBB82A185BD}" type="datetimeFigureOut">
               <a:rPr lang="en-US" dirty="0"/>
-              <a:t>10/31/2016</a:t>
+              <a:t>5/15/17</a:t>
             </a:fld>
             <a:endParaRPr lang="en-US" dirty="0"/>
           </a:p>
@@ -11039,7 +11039,7 @@
           <a:p>
             <a:fld id="{8E665CEB-0076-4E37-B880-BCEA9784DE0A}" type="datetimeFigureOut">
               <a:rPr lang="en-US" dirty="0"/>
-              <a:t>10/31/2016</a:t>
+              <a:t>5/15/17</a:t>
             </a:fld>
             <a:endParaRPr lang="en-US" dirty="0"/>
           </a:p>
@@ -12172,7 +12172,7 @@
           <a:p>
             <a:fld id="{A6149E5E-3896-4118-99A7-7B85668F1C5E}" type="datetimeFigureOut">
               <a:rPr lang="en-US" dirty="0"/>
-              <a:t>10/31/2016</a:t>
+              <a:t>5/15/17</a:t>
             </a:fld>
             <a:endParaRPr lang="en-US" dirty="0"/>
           </a:p>
@@ -13200,7 +13200,7 @@
           <a:p>
             <a:fld id="{7E0D914D-B099-4142-A885-11F276715148}" type="datetimeFigureOut">
               <a:rPr lang="en-US" dirty="0"/>
-              <a:t>10/31/2016</a:t>
+              <a:t>5/15/17</a:t>
             </a:fld>
             <a:endParaRPr lang="en-US" dirty="0"/>
           </a:p>
@@ -13778,12 +13778,43 @@
           <a:lstStyle/>
           <a:p>
             <a:r>
+              <a:rPr lang="en-US" b="1" dirty="0" err="1" smtClean="0">
+                <a:solidFill>
+                  <a:schemeClr val="bg1"/>
+                </a:solidFill>
+              </a:rPr>
+              <a:t>eProject</a:t>
+            </a:r>
+            <a:r>
+              <a:rPr lang="en-US" b="1" dirty="0" smtClean="0">
+                <a:solidFill>
+                  <a:schemeClr val="bg1"/>
+                </a:solidFill>
+              </a:rPr>
+              <a:t> SEM 4</a:t>
+            </a:r>
+            <a:br>
+              <a:rPr lang="en-US" b="1" dirty="0" smtClean="0">
+                <a:solidFill>
+                  <a:schemeClr val="bg1"/>
+                </a:solidFill>
+              </a:rPr>
+            </a:br>
+            <a:r>
+              <a:rPr lang="en-US" b="1" dirty="0" smtClean="0">
+                <a:solidFill>
+                  <a:schemeClr val="bg1"/>
+                </a:solidFill>
+              </a:rPr>
+              <a:t>Alluring Decors</a:t>
+            </a:r>
+            <a:r>
               <a:rPr lang="en-US" b="1" dirty="0">
                 <a:solidFill>
                   <a:schemeClr val="bg1"/>
                 </a:solidFill>
               </a:rPr>
-              <a:t>PROJECT ACCP SEM 3</a:t>
+              <a:t/>
             </a:r>
             <a:br>
               <a:rPr lang="en-US" b="1" dirty="0">
@@ -13941,25 +13972,26 @@
             </a:r>
             <a:r>
               <a:rPr lang="en-US" dirty="0"/>
-              <a:t>Airline Reservation System (ARS) is a software application to assist an airline with transactions related to making ticket reservations, which includes blocking, reserving, canceling and rescheduling tickets</a:t>
+              <a:t>Alluring Decors website is the solution, in which client can advertise with a full span, with images, </a:t>
             </a:r>
             <a:r>
               <a:rPr lang="en-US" dirty="0" smtClean="0"/>
-              <a:t>.</a:t>
-            </a:r>
+              <a:t>business </a:t>
+            </a:r>
+            <a:r>
+              <a:rPr lang="en-US" dirty="0"/>
+              <a:t>management, etc. Also they introduce new tasks and they can advertise the accomplished tasks.</a:t>
+            </a:r>
+            <a:r>
+              <a:rPr lang="en-US" dirty="0"/>
+              <a:t> </a:t>
+            </a:r>
+            <a:endParaRPr lang="en-US" dirty="0" smtClean="0"/>
           </a:p>
           <a:p>
             <a:r>
               <a:rPr lang="en-US" dirty="0" smtClean="0"/>
-              <a:t>Programming Language: </a:t>
-            </a:r>
-            <a:r>
-              <a:rPr lang="en-US" dirty="0" err="1" smtClean="0"/>
-              <a:t>ASP.Net</a:t>
-            </a:r>
-            <a:r>
-              <a:rPr lang="en-US" dirty="0" smtClean="0"/>
-              <a:t>, </a:t>
+              <a:t>Languages and Frameworks: Java Server Faces, </a:t>
             </a:r>
             <a:r>
               <a:rPr lang="en-US" dirty="0" err="1"/>
@@ -14464,13 +14496,18 @@
               <a:t> </a:t>
             </a:r>
             <a:r>
-              <a:rPr lang="en-US" b="1" dirty="0">
+              <a:rPr lang="en-US" b="1" dirty="0" smtClean="0">
                 <a:solidFill>
                   <a:schemeClr val="bg1"/>
                 </a:solidFill>
               </a:rPr>
-              <a:t>Function</a:t>
-            </a:r>
+              <a:t>Functions</a:t>
+            </a:r>
+            <a:endParaRPr lang="en-US" b="1" dirty="0">
+              <a:solidFill>
+                <a:schemeClr val="bg1"/>
+              </a:solidFill>
+            </a:endParaRPr>
           </a:p>
         </p:txBody>
       </p:sp>
@@ -14512,7 +14549,7 @@
         <p:spPr>
           <a:xfrm>
             <a:off x="1127522" y="4105000"/>
-            <a:ext cx="2518756" cy="646331"/>
+            <a:ext cx="2518756" cy="923330"/>
           </a:xfrm>
           <a:prstGeom prst="rect">
             <a:avLst/>
@@ -14527,9 +14564,10 @@
           <a:p>
             <a:pPr algn="ctr"/>
             <a:r>
-              <a:rPr lang="en-US" dirty="0"/>
-              <a:t>Route searching &amp; suggestion</a:t>
-            </a:r>
+              <a:rPr lang="en-US" dirty="0" smtClean="0"/>
+              <a:t>Shows official announcements and information</a:t>
+            </a:r>
+            <a:endParaRPr lang="en-US" dirty="0"/>
           </a:p>
         </p:txBody>
       </p:sp>
@@ -14572,7 +14610,7 @@
         <p:spPr>
           <a:xfrm>
             <a:off x="4868250" y="4105000"/>
-            <a:ext cx="2518756" cy="369332"/>
+            <a:ext cx="2518756" cy="646331"/>
           </a:xfrm>
           <a:prstGeom prst="rect">
             <a:avLst/>
@@ -14587,9 +14625,10 @@
           <a:p>
             <a:pPr algn="ctr"/>
             <a:r>
-              <a:rPr lang="en-US" dirty="0"/>
-              <a:t>Ticket scheduling</a:t>
-            </a:r>
+              <a:rPr lang="en-US" dirty="0" smtClean="0"/>
+              <a:t>Handles service requests</a:t>
+            </a:r>
+            <a:endParaRPr lang="en-US" dirty="0"/>
           </a:p>
         </p:txBody>
       </p:sp>
@@ -14632,7 +14671,7 @@
         <p:spPr>
           <a:xfrm>
             <a:off x="8727706" y="4105000"/>
-            <a:ext cx="2518756" cy="646331"/>
+            <a:ext cx="2518756" cy="923330"/>
           </a:xfrm>
           <a:prstGeom prst="rect">
             <a:avLst/>
@@ -14647,9 +14686,10 @@
           <a:p>
             <a:pPr algn="ctr"/>
             <a:r>
-              <a:rPr lang="en-US" dirty="0"/>
-              <a:t>Flight availability checking</a:t>
-            </a:r>
+              <a:rPr lang="en-US" dirty="0" smtClean="0"/>
+              <a:t>Manages company’s data and information</a:t>
+            </a:r>
+            <a:endParaRPr lang="en-US" dirty="0"/>
           </a:p>
         </p:txBody>
       </p:sp>
@@ -14707,9 +14747,10 @@
           <a:p>
             <a:pPr algn="ctr"/>
             <a:r>
-              <a:rPr lang="en-US" dirty="0"/>
-              <a:t>User profile and ticket management</a:t>
-            </a:r>
+              <a:rPr lang="en-US" dirty="0" smtClean="0"/>
+              <a:t>Handles user feedbacks</a:t>
+            </a:r>
+            <a:endParaRPr lang="en-US" dirty="0"/>
           </a:p>
         </p:txBody>
       </p:sp>
@@ -14767,9 +14808,10 @@
           <a:p>
             <a:pPr algn="ctr"/>
             <a:r>
-              <a:rPr lang="en-US" dirty="0"/>
-              <a:t>System administration</a:t>
-            </a:r>
+              <a:rPr lang="en-US" dirty="0" smtClean="0"/>
+              <a:t>Handles billing and payment process</a:t>
+            </a:r>
+            <a:endParaRPr lang="en-US" dirty="0"/>
           </a:p>
         </p:txBody>
       </p:sp>
@@ -14846,30 +14888,48 @@
           <a:p>
             <a:r>
               <a:rPr lang="en-US" dirty="0" smtClean="0"/>
-              <a:t>- Group </a:t>
+              <a:t>The group </a:t>
             </a:r>
             <a:r>
               <a:rPr lang="en-US" dirty="0"/>
               <a:t>has designed a </a:t>
             </a:r>
             <a:r>
-              <a:rPr lang="en-US"/>
+              <a:rPr lang="en-US" dirty="0" smtClean="0"/>
               <a:t>complete </a:t>
             </a:r>
             <a:r>
-              <a:rPr lang="en-US" smtClean="0"/>
+              <a:rPr lang="en-US" dirty="0" smtClean="0"/>
               <a:t>website </a:t>
             </a:r>
             <a:r>
+              <a:rPr lang="en-US" dirty="0" smtClean="0"/>
+              <a:t>provides the customer with the ability to advertise their works and manage their business.</a:t>
+            </a:r>
+            <a:endParaRPr lang="en-US" dirty="0"/>
+          </a:p>
+          <a:p>
+            <a:r>
+              <a:rPr lang="en-US" dirty="0" smtClean="0"/>
+              <a:t>The </a:t>
+            </a:r>
+            <a:r>
               <a:rPr lang="en-US" dirty="0"/>
-              <a:t>provides information for families.</a:t>
-            </a:r>
-          </a:p>
-          <a:p>
+              <a:t>group </a:t>
+            </a:r>
+            <a:r>
+              <a:rPr lang="en-US" dirty="0" smtClean="0"/>
+              <a:t>has gained </a:t>
+            </a:r>
             <a:r>
               <a:rPr lang="en-US" dirty="0"/>
-              <a:t>- The group has more experience, knowledge about designing website and develop teamwork</a:t>
-            </a:r>
+              <a:t>more experience, knowledge about designing website and </a:t>
+            </a:r>
+            <a:r>
+              <a:rPr lang="en-US" dirty="0" smtClean="0"/>
+              <a:t>teamwork skill.</a:t>
+            </a:r>
+            <a:endParaRPr lang="en-US" dirty="0"/>
           </a:p>
           <a:p>
             <a:r>
@@ -14928,12 +14988,12 @@
           <a:lstStyle/>
           <a:p>
             <a:r>
-              <a:rPr lang="en-US" b="1" dirty="0">
+              <a:rPr lang="en-US" b="1" dirty="0" smtClean="0">
                 <a:solidFill>
                   <a:schemeClr val="bg1"/>
                 </a:solidFill>
               </a:rPr>
-              <a:t>Conclusion</a:t>
+              <a:t>Demo</a:t>
             </a:r>
             <a:endParaRPr lang="en-US" dirty="0"/>
           </a:p>
@@ -14941,71 +15001,26 @@
       </p:sp>
       <p:pic>
         <p:nvPicPr>
-          <p:cNvPr id="4" name="Content Placeholder 3" descr="https://i.gyazo.com/73cd2aa16ccb32ad6ee6e5529ba7e5c9.png"/>
-          <p:cNvPicPr>
-            <a:picLocks noGrp="1"/>
-          </p:cNvPicPr>
-          <p:nvPr>
-            <p:ph idx="1"/>
-          </p:nvPr>
+          <p:cNvPr id="6" name="Picture 5"/>
+          <p:cNvPicPr/>
+          <p:nvPr/>
         </p:nvPicPr>
         <p:blipFill>
-          <a:blip r:embed="rId2">
-            <a:extLst>
-              <a:ext uri="{28A0092B-C50C-407E-A947-70E740481C1C}">
-                <a14:useLocalDpi xmlns:a14="http://schemas.microsoft.com/office/drawing/2010/main" val="0"/>
-              </a:ext>
-            </a:extLst>
-          </a:blip>
-          <a:srcRect/>
+          <a:blip r:embed="rId2"/>
           <a:stretch>
             <a:fillRect/>
           </a:stretch>
         </p:blipFill>
-        <p:spPr bwMode="auto">
+        <p:spPr>
           <a:xfrm>
-            <a:off x="2900626" y="2802577"/>
-            <a:ext cx="6642805" cy="3416300"/>
+            <a:off x="3689873" y="2498483"/>
+            <a:ext cx="4931484" cy="4233509"/>
           </a:xfrm>
           <a:prstGeom prst="rect">
             <a:avLst/>
           </a:prstGeom>
-          <a:noFill/>
-          <a:ln>
-            <a:noFill/>
-          </a:ln>
         </p:spPr>
       </p:pic>
-      <p:sp>
-        <p:nvSpPr>
-          <p:cNvPr id="5" name="TextBox 4"/>
-          <p:cNvSpPr txBox="1"/>
-          <p:nvPr/>
-        </p:nvSpPr>
-        <p:spPr>
-          <a:xfrm>
-            <a:off x="4153993" y="2408298"/>
-            <a:ext cx="4136069" cy="369332"/>
-          </a:xfrm>
-          <a:prstGeom prst="rect">
-            <a:avLst/>
-          </a:prstGeom>
-          <a:noFill/>
-        </p:spPr>
-        <p:txBody>
-          <a:bodyPr wrap="none" rtlCol="0">
-            <a:spAutoFit/>
-          </a:bodyPr>
-          <a:lstStyle/>
-          <a:p>
-            <a:r>
-              <a:rPr lang="en-US" dirty="0" smtClean="0"/>
-              <a:t>Result of final step of booking ticket</a:t>
-            </a:r>
-            <a:endParaRPr lang="en-US" dirty="0"/>
-          </a:p>
-        </p:txBody>
-      </p:sp>
     </p:spTree>
     <p:extLst>
       <p:ext uri="{BB962C8B-B14F-4D97-AF65-F5344CB8AC3E}">

</xml_diff>